<commit_message>
Before Custom Training Model
Pushing current iteration of processes using a built in Keras training module.
</commit_message>
<xml_diff>
--- a/SalesPriceHackathonPresentation.pptx
+++ b/SalesPriceHackathonPresentation.pptx
@@ -5652,6 +5652,14 @@
 <file path=ppt/slides/slide1.xml><?xml version="1.0" encoding="utf-8"?>
 <p:sld xmlns:a="http://schemas.openxmlformats.org/drawingml/2006/main" xmlns:r="http://schemas.openxmlformats.org/officeDocument/2006/relationships" xmlns:p="http://schemas.openxmlformats.org/presentationml/2006/main">
   <p:cSld>
+    <p:bg>
+      <p:bgPr>
+        <a:solidFill>
+          <a:schemeClr val="bg1"/>
+        </a:solidFill>
+        <a:effectLst/>
+      </p:bgPr>
+    </p:bg>
     <p:spTree>
       <p:nvGrpSpPr>
         <p:cNvPr id="1" name=""/>
@@ -5666,6 +5674,111 @@
           <a:chExt cx="0" cy="0"/>
         </a:xfrm>
       </p:grpSpPr>
+      <p:sp useBgFill="1">
+        <p:nvSpPr>
+          <p:cNvPr id="1031" name="Rectangle 1030">
+            <a:extLst>
+              <a:ext uri="{FF2B5EF4-FFF2-40B4-BE49-F238E27FC236}">
+                <a16:creationId xmlns:a16="http://schemas.microsoft.com/office/drawing/2014/main" id="{BD7C2DEF-63C5-495B-BBE5-720E5D12B4D2}"/>
+              </a:ext>
+              <a:ext uri="{C183D7F6-B498-43B3-948B-1728B52AA6E4}">
+                <adec:decorative xmlns:adec="http://schemas.microsoft.com/office/drawing/2017/decorative" val="1"/>
+              </a:ext>
+            </a:extLst>
+          </p:cNvPr>
+          <p:cNvSpPr>
+            <a:spLocks noGrp="1" noRot="1" noChangeAspect="1" noMove="1" noResize="1" noEditPoints="1" noAdjustHandles="1" noChangeArrowheads="1" noChangeShapeType="1" noTextEdit="1"/>
+          </p:cNvSpPr>
+          <p:nvPr>
+            <p:extLst>
+              <p:ext uri="{386F3935-93C4-4BCD-93E2-E3B085C9AB24}">
+                <p16:designElem xmlns:p16="http://schemas.microsoft.com/office/powerpoint/2015/main" val="1"/>
+              </p:ext>
+            </p:extLst>
+          </p:nvPr>
+        </p:nvSpPr>
+        <p:spPr>
+          <a:xfrm>
+            <a:off x="0" y="0"/>
+            <a:ext cx="12192000" cy="6858000"/>
+          </a:xfrm>
+          <a:prstGeom prst="rect">
+            <a:avLst/>
+          </a:prstGeom>
+          <a:ln>
+            <a:noFill/>
+          </a:ln>
+        </p:spPr>
+        <p:style>
+          <a:lnRef idx="2">
+            <a:schemeClr val="accent1">
+              <a:shade val="50000"/>
+            </a:schemeClr>
+          </a:lnRef>
+          <a:fillRef idx="1">
+            <a:schemeClr val="accent1"/>
+          </a:fillRef>
+          <a:effectRef idx="0">
+            <a:schemeClr val="accent1"/>
+          </a:effectRef>
+          <a:fontRef idx="minor">
+            <a:schemeClr val="lt1"/>
+          </a:fontRef>
+        </p:style>
+        <p:txBody>
+          <a:bodyPr rtlCol="0" anchor="ctr"/>
+          <a:lstStyle/>
+          <a:p>
+            <a:pPr algn="ctr"/>
+            <a:endParaRPr lang="en-US"/>
+          </a:p>
+        </p:txBody>
+      </p:sp>
+      <p:pic>
+        <p:nvPicPr>
+          <p:cNvPr id="1033" name="Picture 1032">
+            <a:extLst>
+              <a:ext uri="{FF2B5EF4-FFF2-40B4-BE49-F238E27FC236}">
+                <a16:creationId xmlns:a16="http://schemas.microsoft.com/office/drawing/2014/main" id="{FE21E403-0B61-4473-BE57-AB0F16379674}"/>
+              </a:ext>
+              <a:ext uri="{C183D7F6-B498-43B3-948B-1728B52AA6E4}">
+                <adec:decorative xmlns:adec="http://schemas.microsoft.com/office/drawing/2017/decorative" val="1"/>
+              </a:ext>
+            </a:extLst>
+          </p:cNvPr>
+          <p:cNvPicPr>
+            <a:picLocks noGrp="1" noRot="1" noChangeAspect="1" noMove="1" noResize="1" noEditPoints="1" noAdjustHandles="1" noChangeArrowheads="1" noChangeShapeType="1" noCrop="1"/>
+          </p:cNvPicPr>
+          <p:nvPr>
+            <p:extLst>
+              <p:ext uri="{386F3935-93C4-4BCD-93E2-E3B085C9AB24}">
+                <p16:designElem xmlns:p16="http://schemas.microsoft.com/office/powerpoint/2015/main" val="1"/>
+              </p:ext>
+            </p:extLst>
+          </p:nvPr>
+        </p:nvPicPr>
+        <p:blipFill>
+          <a:blip r:embed="rId2">
+            <a:extLst>
+              <a:ext uri="{28A0092B-C50C-407E-A947-70E740481C1C}">
+                <a14:useLocalDpi xmlns:a14="http://schemas.microsoft.com/office/drawing/2010/main" val="0"/>
+              </a:ext>
+            </a:extLst>
+          </a:blip>
+          <a:stretch>
+            <a:fillRect/>
+          </a:stretch>
+        </p:blipFill>
+        <p:spPr>
+          <a:xfrm>
+            <a:off x="0" y="0"/>
+            <a:ext cx="12192000" cy="1441450"/>
+          </a:xfrm>
+          <a:prstGeom prst="rect">
+            <a:avLst/>
+          </a:prstGeom>
+        </p:spPr>
+      </p:pic>
       <p:sp>
         <p:nvSpPr>
           <p:cNvPr id="2" name="Title 1">
@@ -5684,9 +5797,14 @@
         </p:nvSpPr>
         <p:spPr>
           <a:xfrm>
-            <a:off x="1371600" y="1803405"/>
-            <a:ext cx="10112188" cy="1825096"/>
-          </a:xfrm>
+            <a:off x="636696" y="643464"/>
+            <a:ext cx="3761964" cy="3273061"/>
+          </a:xfrm>
+          <a:noFill/>
+          <a:ln w="19050">
+            <a:noFill/>
+            <a:prstDash val="dash"/>
+          </a:ln>
         </p:spPr>
         <p:txBody>
           <a:bodyPr>
@@ -5694,8 +5812,9 @@
           </a:bodyPr>
           <a:lstStyle/>
           <a:p>
-            <a:r>
-              <a:rPr lang="en-US" dirty="0"/>
+            <a:pPr algn="r"/>
+            <a:r>
+              <a:rPr lang="en-US" sz="4800"/>
               <a:t>Deep learning Algorithm</a:t>
             </a:r>
           </a:p>
@@ -5717,18 +5836,78 @@
             <p:ph type="subTitle" idx="1"/>
           </p:nvPr>
         </p:nvSpPr>
-        <p:spPr/>
-        <p:txBody>
-          <a:bodyPr/>
-          <a:lstStyle/>
-          <a:p>
+        <p:spPr>
+          <a:xfrm>
+            <a:off x="636695" y="3923151"/>
+            <a:ext cx="3761965" cy="2293885"/>
+          </a:xfrm>
+          <a:noFill/>
+          <a:ln w="19050">
+            <a:noFill/>
+            <a:prstDash val="dash"/>
+          </a:ln>
+        </p:spPr>
+        <p:txBody>
+          <a:bodyPr>
+            <a:normAutofit/>
+          </a:bodyPr>
+          <a:lstStyle/>
+          <a:p>
+            <a:pPr algn="r"/>
             <a:r>
               <a:rPr lang="en-US" dirty="0"/>
               <a:t>Presenters: Brody Hageneder</a:t>
             </a:r>
-          </a:p>
-        </p:txBody>
-      </p:sp>
+            <a:endParaRPr lang="en-US"/>
+          </a:p>
+        </p:txBody>
+      </p:sp>
+      <p:pic>
+        <p:nvPicPr>
+          <p:cNvPr id="1026" name="Picture 2" descr="20 Best Spring Flowers - Popular Flowers to Plant in Spring">
+            <a:extLst>
+              <a:ext uri="{FF2B5EF4-FFF2-40B4-BE49-F238E27FC236}">
+                <a16:creationId xmlns:a16="http://schemas.microsoft.com/office/drawing/2014/main" id="{7DC5AED2-F6E3-511E-9CD4-B783684DFC44}"/>
+              </a:ext>
+            </a:extLst>
+          </p:cNvPr>
+          <p:cNvPicPr>
+            <a:picLocks noChangeAspect="1" noChangeArrowheads="1"/>
+          </p:cNvPicPr>
+          <p:nvPr/>
+        </p:nvPicPr>
+        <p:blipFill>
+          <a:blip r:embed="rId3">
+            <a:extLst>
+              <a:ext uri="{28A0092B-C50C-407E-A947-70E740481C1C}">
+                <a14:useLocalDpi xmlns:a14="http://schemas.microsoft.com/office/drawing/2010/main" val="0"/>
+              </a:ext>
+            </a:extLst>
+          </a:blip>
+          <a:stretch>
+            <a:fillRect/>
+          </a:stretch>
+        </p:blipFill>
+        <p:spPr bwMode="auto">
+          <a:xfrm>
+            <a:off x="5566680" y="941122"/>
+            <a:ext cx="5137883" cy="5115048"/>
+          </a:xfrm>
+          <a:prstGeom prst="rect">
+            <a:avLst/>
+          </a:prstGeom>
+          <a:noFill/>
+          <a:extLst>
+            <a:ext uri="{909E8E84-426E-40DD-AFC4-6F175D3DCCD1}">
+              <a14:hiddenFill xmlns:a14="http://schemas.microsoft.com/office/drawing/2010/main">
+                <a:solidFill>
+                  <a:srgbClr val="FFFFFF"/>
+                </a:solidFill>
+              </a14:hiddenFill>
+            </a:ext>
+          </a:extLst>
+        </p:spPr>
+      </p:pic>
     </p:spTree>
     <p:extLst>
       <p:ext uri="{BB962C8B-B14F-4D97-AF65-F5344CB8AC3E}">
@@ -5910,7 +6089,7 @@
           <a:p>
             <a:r>
               <a:rPr lang="en-US" dirty="0"/>
-              <a:t>What Store to Use as Control?</a:t>
+              <a:t>Control group?</a:t>
             </a:r>
           </a:p>
         </p:txBody>
@@ -5942,21 +6121,9 @@
             </a:r>
           </a:p>
           <a:p>
-            <a:endParaRPr lang="en-US" dirty="0"/>
-          </a:p>
-          <a:p>
             <a:r>
               <a:rPr lang="en-US" dirty="0"/>
-              <a:t>After having to sign up for a lot of develop and seller profiles, I decided against this option</a:t>
-            </a:r>
-          </a:p>
-          <a:p>
-            <a:endParaRPr lang="en-US" dirty="0"/>
-          </a:p>
-          <a:p>
-            <a:r>
-              <a:rPr lang="en-US" dirty="0"/>
-              <a:t>Utilizing </a:t>
+              <a:t>Changed to utilizing </a:t>
             </a:r>
             <a:r>
               <a:rPr lang="en-US" dirty="0" err="1"/>
@@ -5964,7 +6131,21 @@
             </a:r>
             <a:r>
               <a:rPr lang="en-US" dirty="0"/>
-              <a:t> to obtain a target API requests within Python environment.</a:t>
+              <a:t> to obtain a target API requests within Python Environment</a:t>
+            </a:r>
+          </a:p>
+          <a:p>
+            <a:r>
+              <a:rPr lang="en-US" dirty="0"/>
+              <a:t>Referred to a </a:t>
+            </a:r>
+            <a:r>
+              <a:rPr lang="en-US" dirty="0" err="1"/>
+              <a:t>TensorFlower</a:t>
+            </a:r>
+            <a:r>
+              <a:rPr lang="en-US" dirty="0"/>
+              <a:t> API and application to develop image validation processing.</a:t>
             </a:r>
           </a:p>
         </p:txBody>
@@ -6093,6 +6274,14 @@
 <file path=ppt/slides/slide5.xml><?xml version="1.0" encoding="utf-8"?>
 <p:sld xmlns:a="http://schemas.openxmlformats.org/drawingml/2006/main" xmlns:r="http://schemas.openxmlformats.org/officeDocument/2006/relationships" xmlns:p="http://schemas.openxmlformats.org/presentationml/2006/main">
   <p:cSld>
+    <p:bg>
+      <p:bgPr>
+        <a:solidFill>
+          <a:schemeClr val="bg1"/>
+        </a:solidFill>
+        <a:effectLst/>
+      </p:bgPr>
+    </p:bg>
     <p:spTree>
       <p:nvGrpSpPr>
         <p:cNvPr id="1" name=""/>
@@ -6107,6 +6296,111 @@
           <a:chExt cx="0" cy="0"/>
         </a:xfrm>
       </p:grpSpPr>
+      <p:sp useBgFill="1">
+        <p:nvSpPr>
+          <p:cNvPr id="12" name="Rectangle 11">
+            <a:extLst>
+              <a:ext uri="{FF2B5EF4-FFF2-40B4-BE49-F238E27FC236}">
+                <a16:creationId xmlns:a16="http://schemas.microsoft.com/office/drawing/2014/main" id="{CD94F7C0-1344-4B3C-AFCB-E7F006BB5348}"/>
+              </a:ext>
+              <a:ext uri="{C183D7F6-B498-43B3-948B-1728B52AA6E4}">
+                <adec:decorative xmlns:adec="http://schemas.microsoft.com/office/drawing/2017/decorative" val="1"/>
+              </a:ext>
+            </a:extLst>
+          </p:cNvPr>
+          <p:cNvSpPr>
+            <a:spLocks noGrp="1" noRot="1" noChangeAspect="1" noMove="1" noResize="1" noEditPoints="1" noAdjustHandles="1" noChangeArrowheads="1" noChangeShapeType="1" noTextEdit="1"/>
+          </p:cNvSpPr>
+          <p:nvPr>
+            <p:extLst>
+              <p:ext uri="{386F3935-93C4-4BCD-93E2-E3B085C9AB24}">
+                <p16:designElem xmlns:p16="http://schemas.microsoft.com/office/powerpoint/2015/main" val="1"/>
+              </p:ext>
+            </p:extLst>
+          </p:nvPr>
+        </p:nvSpPr>
+        <p:spPr>
+          <a:xfrm>
+            <a:off x="0" y="0"/>
+            <a:ext cx="12192000" cy="6858000"/>
+          </a:xfrm>
+          <a:prstGeom prst="rect">
+            <a:avLst/>
+          </a:prstGeom>
+          <a:ln>
+            <a:noFill/>
+          </a:ln>
+        </p:spPr>
+        <p:style>
+          <a:lnRef idx="2">
+            <a:schemeClr val="accent1">
+              <a:shade val="50000"/>
+            </a:schemeClr>
+          </a:lnRef>
+          <a:fillRef idx="1">
+            <a:schemeClr val="accent1"/>
+          </a:fillRef>
+          <a:effectRef idx="0">
+            <a:schemeClr val="accent1"/>
+          </a:effectRef>
+          <a:fontRef idx="minor">
+            <a:schemeClr val="lt1"/>
+          </a:fontRef>
+        </p:style>
+        <p:txBody>
+          <a:bodyPr rtlCol="0" anchor="ctr"/>
+          <a:lstStyle/>
+          <a:p>
+            <a:pPr algn="ctr"/>
+            <a:endParaRPr lang="en-US"/>
+          </a:p>
+        </p:txBody>
+      </p:sp>
+      <p:pic>
+        <p:nvPicPr>
+          <p:cNvPr id="14" name="Picture 13">
+            <a:extLst>
+              <a:ext uri="{FF2B5EF4-FFF2-40B4-BE49-F238E27FC236}">
+                <a16:creationId xmlns:a16="http://schemas.microsoft.com/office/drawing/2014/main" id="{4EC584A2-4215-4DB8-AE1F-E3768D77E8DE}"/>
+              </a:ext>
+              <a:ext uri="{C183D7F6-B498-43B3-948B-1728B52AA6E4}">
+                <adec:decorative xmlns:adec="http://schemas.microsoft.com/office/drawing/2017/decorative" val="1"/>
+              </a:ext>
+            </a:extLst>
+          </p:cNvPr>
+          <p:cNvPicPr>
+            <a:picLocks noGrp="1" noRot="1" noChangeAspect="1" noMove="1" noResize="1" noEditPoints="1" noAdjustHandles="1" noChangeArrowheads="1" noChangeShapeType="1" noCrop="1"/>
+          </p:cNvPicPr>
+          <p:nvPr>
+            <p:extLst>
+              <p:ext uri="{386F3935-93C4-4BCD-93E2-E3B085C9AB24}">
+                <p16:designElem xmlns:p16="http://schemas.microsoft.com/office/powerpoint/2015/main" val="1"/>
+              </p:ext>
+            </p:extLst>
+          </p:nvPr>
+        </p:nvPicPr>
+        <p:blipFill>
+          <a:blip r:embed="rId2">
+            <a:extLst>
+              <a:ext uri="{28A0092B-C50C-407E-A947-70E740481C1C}">
+                <a14:useLocalDpi xmlns:a14="http://schemas.microsoft.com/office/drawing/2010/main" val="0"/>
+              </a:ext>
+            </a:extLst>
+          </a:blip>
+          <a:stretch>
+            <a:fillRect/>
+          </a:stretch>
+        </p:blipFill>
+        <p:spPr>
+          <a:xfrm>
+            <a:off x="0" y="0"/>
+            <a:ext cx="12192000" cy="1441450"/>
+          </a:xfrm>
+          <a:prstGeom prst="rect">
+            <a:avLst/>
+          </a:prstGeom>
+        </p:spPr>
+      </p:pic>
       <p:sp>
         <p:nvSpPr>
           <p:cNvPr id="2" name="Title 1">
@@ -6123,21 +6417,32 @@
             <p:ph type="title"/>
           </p:nvPr>
         </p:nvSpPr>
-        <p:spPr/>
-        <p:txBody>
-          <a:bodyPr/>
-          <a:lstStyle/>
-          <a:p>
-            <a:endParaRPr lang="en-US"/>
-          </a:p>
-        </p:txBody>
-      </p:sp>
-      <p:sp>
-        <p:nvSpPr>
-          <p:cNvPr id="3" name="Content Placeholder 2">
+        <p:spPr>
+          <a:xfrm>
+            <a:off x="685799" y="764373"/>
+            <a:ext cx="3977639" cy="1600200"/>
+          </a:xfrm>
+        </p:spPr>
+        <p:txBody>
+          <a:bodyPr anchor="b">
+            <a:normAutofit/>
+          </a:bodyPr>
+          <a:lstStyle/>
+          <a:p>
+            <a:pPr algn="l"/>
+            <a:r>
+              <a:rPr lang="en-US" sz="3200"/>
+              <a:t>Results</a:t>
+            </a:r>
+          </a:p>
+        </p:txBody>
+      </p:sp>
+      <p:sp>
+        <p:nvSpPr>
+          <p:cNvPr id="9" name="Content Placeholder 8">
             <a:extLst>
               <a:ext uri="{FF2B5EF4-FFF2-40B4-BE49-F238E27FC236}">
-                <a16:creationId xmlns:a16="http://schemas.microsoft.com/office/drawing/2014/main" id="{42FD0F83-3003-9780-4129-8E82F1F1AA00}"/>
+                <a16:creationId xmlns:a16="http://schemas.microsoft.com/office/drawing/2014/main" id="{A4C0F013-9007-0C4E-A800-53391B0C1D09}"/>
               </a:ext>
             </a:extLst>
           </p:cNvPr>
@@ -6148,15 +6453,79 @@
             <p:ph idx="1"/>
           </p:nvPr>
         </p:nvSpPr>
-        <p:spPr/>
-        <p:txBody>
-          <a:bodyPr/>
-          <a:lstStyle/>
-          <a:p>
-            <a:endParaRPr lang="en-US"/>
-          </a:p>
-        </p:txBody>
-      </p:sp>
+        <p:spPr>
+          <a:xfrm>
+            <a:off x="685800" y="2364573"/>
+            <a:ext cx="3977639" cy="3854112"/>
+          </a:xfrm>
+        </p:spPr>
+        <p:txBody>
+          <a:bodyPr>
+            <a:normAutofit/>
+          </a:bodyPr>
+          <a:lstStyle/>
+          <a:p>
+            <a:r>
+              <a:rPr lang="en-US" sz="1600" dirty="0"/>
+              <a:t>Script processed image data stored in local space</a:t>
+            </a:r>
+          </a:p>
+          <a:p>
+            <a:r>
+              <a:rPr lang="en-US" sz="1600" dirty="0"/>
+              <a:t>Would give an accuracy rating on how much it “lost” the visualized process</a:t>
+            </a:r>
+          </a:p>
+          <a:p>
+            <a:r>
+              <a:rPr lang="en-US" sz="1600" dirty="0"/>
+              <a:t>Model would classify the images that it is passed in three Epochs or “sets”</a:t>
+            </a:r>
+          </a:p>
+          <a:p>
+            <a:pPr marL="0" indent="0">
+              <a:buNone/>
+            </a:pPr>
+            <a:endParaRPr lang="en-US" sz="1600"/>
+          </a:p>
+          <a:p>
+            <a:pPr marL="0" indent="0">
+              <a:buNone/>
+            </a:pPr>
+            <a:endParaRPr lang="en-US" sz="1600" dirty="0"/>
+          </a:p>
+        </p:txBody>
+      </p:sp>
+      <p:pic>
+        <p:nvPicPr>
+          <p:cNvPr id="5" name="Content Placeholder 4" descr="Text&#10;&#10;Description automatically generated">
+            <a:extLst>
+              <a:ext uri="{FF2B5EF4-FFF2-40B4-BE49-F238E27FC236}">
+                <a16:creationId xmlns:a16="http://schemas.microsoft.com/office/drawing/2014/main" id="{35C54DA9-738C-8051-9031-DFB4CE608403}"/>
+              </a:ext>
+            </a:extLst>
+          </p:cNvPr>
+          <p:cNvPicPr>
+            <a:picLocks noChangeAspect="1"/>
+          </p:cNvPicPr>
+          <p:nvPr/>
+        </p:nvPicPr>
+        <p:blipFill>
+          <a:blip r:embed="rId3"/>
+          <a:stretch>
+            <a:fillRect/>
+          </a:stretch>
+        </p:blipFill>
+        <p:spPr>
+          <a:xfrm>
+            <a:off x="4972699" y="2530804"/>
+            <a:ext cx="6533501" cy="1903201"/>
+          </a:xfrm>
+          <a:prstGeom prst="rect">
+            <a:avLst/>
+          </a:prstGeom>
+        </p:spPr>
+      </p:pic>
     </p:spTree>
     <p:extLst>
       <p:ext uri="{BB962C8B-B14F-4D97-AF65-F5344CB8AC3E}">

</xml_diff>

<commit_message>
Final Commit For Hack
</commit_message>
<xml_diff>
--- a/SalesPriceHackathonPresentation.pptx
+++ b/SalesPriceHackathonPresentation.pptx
@@ -6131,21 +6131,13 @@
             </a:r>
             <a:r>
               <a:rPr lang="en-US" dirty="0"/>
-              <a:t> to obtain a target API requests within Python Environment</a:t>
+              <a:t> to obtain a Target Store API requests within Python Environment</a:t>
             </a:r>
           </a:p>
           <a:p>
             <a:r>
               <a:rPr lang="en-US" dirty="0"/>
-              <a:t>Referred to a </a:t>
-            </a:r>
-            <a:r>
-              <a:rPr lang="en-US" dirty="0" err="1"/>
-              <a:t>TensorFlower</a:t>
-            </a:r>
-            <a:r>
-              <a:rPr lang="en-US" dirty="0"/>
-              <a:t> API and application to develop image validation processing.</a:t>
+              <a:t>Referred to a TensorFlow API and application to develop image validation processing.</a:t>
             </a:r>
           </a:p>
         </p:txBody>
@@ -6479,14 +6471,14 @@
           <a:p>
             <a:r>
               <a:rPr lang="en-US" sz="1600" dirty="0"/>
-              <a:t>Model would classify the images that it is passed in three Epochs or “sets”</a:t>
+              <a:t>Model would classify the images that it is passed in Epochs or “iterations”</a:t>
             </a:r>
           </a:p>
           <a:p>
             <a:pPr marL="0" indent="0">
               <a:buNone/>
             </a:pPr>
-            <a:endParaRPr lang="en-US" sz="1600"/>
+            <a:endParaRPr lang="en-US" sz="1600" dirty="0"/>
           </a:p>
           <a:p>
             <a:pPr marL="0" indent="0">

</xml_diff>